<commit_message>
added my slides for presenation
</commit_message>
<xml_diff>
--- a/project-presentaion.pptx
+++ b/project-presentaion.pptx
@@ -7,7 +7,9 @@
   <p:sldIdLst>
     <p:sldId id="256" r:id="rId2"/>
     <p:sldId id="257" r:id="rId3"/>
-    <p:sldId id="258" r:id="rId4"/>
+    <p:sldId id="259" r:id="rId4"/>
+    <p:sldId id="260" r:id="rId5"/>
+    <p:sldId id="261" r:id="rId6"/>
   </p:sldIdLst>
   <p:sldSz cx="12192000" cy="6858000"/>
   <p:notesSz cx="6858000" cy="9144000"/>
@@ -106,6 +108,11 @@
       </a:defRPr>
     </a:lvl9pPr>
   </p:defaultTextStyle>
+  <p:extLst>
+    <p:ext uri="{EFAFB233-063F-42B5-8137-9DF3F51BA10A}">
+      <p15:sldGuideLst xmlns:p15="http://schemas.microsoft.com/office/powerpoint/2012/main"/>
+    </p:ext>
+  </p:extLst>
 </p:presentation>
 </file>
 
@@ -256,7 +263,7 @@
           <a:p>
             <a:fld id="{98C7A206-153C-9744-950F-B89B7F12F126}" type="datetimeFigureOut">
               <a:rPr lang="en-US" smtClean="0"/>
-              <a:t>1/28/20</a:t>
+              <a:t>1/29/20</a:t>
             </a:fld>
             <a:endParaRPr lang="en-US"/>
           </a:p>
@@ -454,7 +461,7 @@
           <a:p>
             <a:fld id="{98C7A206-153C-9744-950F-B89B7F12F126}" type="datetimeFigureOut">
               <a:rPr lang="en-US" smtClean="0"/>
-              <a:t>1/28/20</a:t>
+              <a:t>1/29/20</a:t>
             </a:fld>
             <a:endParaRPr lang="en-US"/>
           </a:p>
@@ -662,7 +669,7 @@
           <a:p>
             <a:fld id="{98C7A206-153C-9744-950F-B89B7F12F126}" type="datetimeFigureOut">
               <a:rPr lang="en-US" smtClean="0"/>
-              <a:t>1/28/20</a:t>
+              <a:t>1/29/20</a:t>
             </a:fld>
             <a:endParaRPr lang="en-US"/>
           </a:p>
@@ -860,7 +867,7 @@
           <a:p>
             <a:fld id="{98C7A206-153C-9744-950F-B89B7F12F126}" type="datetimeFigureOut">
               <a:rPr lang="en-US" smtClean="0"/>
-              <a:t>1/28/20</a:t>
+              <a:t>1/29/20</a:t>
             </a:fld>
             <a:endParaRPr lang="en-US"/>
           </a:p>
@@ -1135,7 +1142,7 @@
           <a:p>
             <a:fld id="{98C7A206-153C-9744-950F-B89B7F12F126}" type="datetimeFigureOut">
               <a:rPr lang="en-US" smtClean="0"/>
-              <a:t>1/28/20</a:t>
+              <a:t>1/29/20</a:t>
             </a:fld>
             <a:endParaRPr lang="en-US"/>
           </a:p>
@@ -1400,7 +1407,7 @@
           <a:p>
             <a:fld id="{98C7A206-153C-9744-950F-B89B7F12F126}" type="datetimeFigureOut">
               <a:rPr lang="en-US" smtClean="0"/>
-              <a:t>1/28/20</a:t>
+              <a:t>1/29/20</a:t>
             </a:fld>
             <a:endParaRPr lang="en-US"/>
           </a:p>
@@ -1812,7 +1819,7 @@
           <a:p>
             <a:fld id="{98C7A206-153C-9744-950F-B89B7F12F126}" type="datetimeFigureOut">
               <a:rPr lang="en-US" smtClean="0"/>
-              <a:t>1/28/20</a:t>
+              <a:t>1/29/20</a:t>
             </a:fld>
             <a:endParaRPr lang="en-US"/>
           </a:p>
@@ -1953,7 +1960,7 @@
           <a:p>
             <a:fld id="{98C7A206-153C-9744-950F-B89B7F12F126}" type="datetimeFigureOut">
               <a:rPr lang="en-US" smtClean="0"/>
-              <a:t>1/28/20</a:t>
+              <a:t>1/29/20</a:t>
             </a:fld>
             <a:endParaRPr lang="en-US"/>
           </a:p>
@@ -2066,7 +2073,7 @@
           <a:p>
             <a:fld id="{98C7A206-153C-9744-950F-B89B7F12F126}" type="datetimeFigureOut">
               <a:rPr lang="en-US" smtClean="0"/>
-              <a:t>1/28/20</a:t>
+              <a:t>1/29/20</a:t>
             </a:fld>
             <a:endParaRPr lang="en-US"/>
           </a:p>
@@ -2377,7 +2384,7 @@
           <a:p>
             <a:fld id="{98C7A206-153C-9744-950F-B89B7F12F126}" type="datetimeFigureOut">
               <a:rPr lang="en-US" smtClean="0"/>
-              <a:t>1/28/20</a:t>
+              <a:t>1/29/20</a:t>
             </a:fld>
             <a:endParaRPr lang="en-US"/>
           </a:p>
@@ -2665,7 +2672,7 @@
           <a:p>
             <a:fld id="{98C7A206-153C-9744-950F-B89B7F12F126}" type="datetimeFigureOut">
               <a:rPr lang="en-US" smtClean="0"/>
-              <a:t>1/28/20</a:t>
+              <a:t>1/29/20</a:t>
             </a:fld>
             <a:endParaRPr lang="en-US"/>
           </a:p>
@@ -2906,7 +2913,7 @@
           <a:p>
             <a:fld id="{98C7A206-153C-9744-950F-B89B7F12F126}" type="datetimeFigureOut">
               <a:rPr lang="en-US" smtClean="0"/>
-              <a:t>1/28/20</a:t>
+              <a:t>1/29/20</a:t>
             </a:fld>
             <a:endParaRPr lang="en-US"/>
           </a:p>
@@ -3419,7 +3426,12 @@
             <p:ph type="title"/>
           </p:nvPr>
         </p:nvSpPr>
-        <p:spPr/>
+        <p:spPr>
+          <a:xfrm>
+            <a:off x="0" y="0"/>
+            <a:ext cx="10515600" cy="1325563"/>
+          </a:xfrm>
+        </p:spPr>
         <p:txBody>
           <a:bodyPr/>
           <a:lstStyle/>
@@ -3431,40 +3443,809 @@
           </a:p>
         </p:txBody>
       </p:sp>
-      <p:sp>
-        <p:nvSpPr>
-          <p:cNvPr id="3" name="Content Placeholder 2">
-            <a:extLst>
-              <a:ext uri="{FF2B5EF4-FFF2-40B4-BE49-F238E27FC236}">
-                <a16:creationId xmlns:a16="http://schemas.microsoft.com/office/drawing/2014/main" id="{B75013D3-D3A3-7A43-AF1D-08EE91D065B5}"/>
-              </a:ext>
-            </a:extLst>
-          </p:cNvPr>
-          <p:cNvSpPr>
-            <a:spLocks noGrp="1"/>
-          </p:cNvSpPr>
-          <p:nvPr>
-            <p:ph idx="1"/>
-          </p:nvPr>
-        </p:nvSpPr>
-        <p:spPr/>
-        <p:txBody>
-          <a:bodyPr/>
-          <a:lstStyle/>
-          <a:p>
-            <a:r>
-              <a:rPr lang="en-US" dirty="0"/>
-              <a:t>Code snip</a:t>
-            </a:r>
-          </a:p>
-          <a:p>
-            <a:r>
-              <a:rPr lang="en-US" dirty="0"/>
-              <a:t>plot</a:t>
-            </a:r>
-          </a:p>
-        </p:txBody>
-      </p:sp>
+      <p:pic>
+        <p:nvPicPr>
+          <p:cNvPr id="9" name="Picture 8" descr="A close up of a map&#10;&#10;Description automatically generated">
+            <a:extLst>
+              <a:ext uri="{FF2B5EF4-FFF2-40B4-BE49-F238E27FC236}">
+                <a16:creationId xmlns:a16="http://schemas.microsoft.com/office/drawing/2014/main" id="{5D937307-DED4-0A42-95C6-5732B74C6771}"/>
+              </a:ext>
+            </a:extLst>
+          </p:cNvPr>
+          <p:cNvPicPr>
+            <a:picLocks noChangeAspect="1"/>
+          </p:cNvPicPr>
+          <p:nvPr/>
+        </p:nvPicPr>
+        <p:blipFill>
+          <a:blip r:embed="rId2"/>
+          <a:stretch>
+            <a:fillRect/>
+          </a:stretch>
+        </p:blipFill>
+        <p:spPr>
+          <a:xfrm>
+            <a:off x="7128270" y="264307"/>
+            <a:ext cx="4897041" cy="3264694"/>
+          </a:xfrm>
+          <a:prstGeom prst="rect">
+            <a:avLst/>
+          </a:prstGeom>
+        </p:spPr>
+      </p:pic>
+      <p:pic>
+        <p:nvPicPr>
+          <p:cNvPr id="7" name="Picture 6">
+            <a:extLst>
+              <a:ext uri="{FF2B5EF4-FFF2-40B4-BE49-F238E27FC236}">
+                <a16:creationId xmlns:a16="http://schemas.microsoft.com/office/drawing/2014/main" id="{52C7D0E9-0C2B-114A-85B8-0BD9F955F0EF}"/>
+              </a:ext>
+            </a:extLst>
+          </p:cNvPr>
+          <p:cNvPicPr>
+            <a:picLocks noChangeAspect="1"/>
+          </p:cNvPicPr>
+          <p:nvPr/>
+        </p:nvPicPr>
+        <p:blipFill>
+          <a:blip r:embed="rId3"/>
+          <a:stretch>
+            <a:fillRect/>
+          </a:stretch>
+        </p:blipFill>
+        <p:spPr>
+          <a:xfrm>
+            <a:off x="91756" y="1325563"/>
+            <a:ext cx="7101211" cy="4421187"/>
+          </a:xfrm>
+          <a:prstGeom prst="rect">
+            <a:avLst/>
+          </a:prstGeom>
+        </p:spPr>
+      </p:pic>
+      <mc:AlternateContent xmlns:mc="http://schemas.openxmlformats.org/markup-compatibility/2006">
+        <mc:Choice xmlns:a14="http://schemas.microsoft.com/office/drawing/2010/main" Requires="a14">
+          <p:sp>
+            <p:nvSpPr>
+              <p:cNvPr id="10" name="TextBox 9">
+                <a:extLst>
+                  <a:ext uri="{FF2B5EF4-FFF2-40B4-BE49-F238E27FC236}">
+                    <a16:creationId xmlns:a16="http://schemas.microsoft.com/office/drawing/2014/main" id="{0EB3CA63-E32D-1A47-AA9B-3F34F66172E7}"/>
+                  </a:ext>
+                </a:extLst>
+              </p:cNvPr>
+              <p:cNvSpPr txBox="1"/>
+              <p:nvPr/>
+            </p:nvSpPr>
+            <p:spPr>
+              <a:xfrm>
+                <a:off x="7192967" y="4200855"/>
+                <a:ext cx="4637103" cy="605679"/>
+              </a:xfrm>
+              <a:prstGeom prst="rect">
+                <a:avLst/>
+              </a:prstGeom>
+              <a:noFill/>
+            </p:spPr>
+            <p:txBody>
+              <a:bodyPr wrap="none" lIns="0" tIns="0" rIns="0" bIns="0" rtlCol="0">
+                <a:spAutoFit/>
+              </a:bodyPr>
+              <a:lstStyle/>
+              <a:p>
+                <a14:m>
+                  <m:oMathPara xmlns:m="http://schemas.openxmlformats.org/officeDocument/2006/math">
+                    <m:oMathParaPr>
+                      <m:jc m:val="centerGroup"/>
+                    </m:oMathParaPr>
+                    <m:oMath xmlns:m="http://schemas.openxmlformats.org/officeDocument/2006/math">
+                      <m:r>
+                        <a:rPr lang="en-US" sz="1400" b="0" i="1" smtClean="0">
+                          <a:latin typeface="Cambria Math" panose="02040503050406030204" pitchFamily="18" charset="0"/>
+                        </a:rPr>
+                        <m:t>𝑃𝑀</m:t>
+                      </m:r>
+                      <m:r>
+                        <a:rPr lang="en-US" sz="1400" b="0" i="1" smtClean="0">
+                          <a:latin typeface="Cambria Math" panose="02040503050406030204" pitchFamily="18" charset="0"/>
+                        </a:rPr>
+                        <m:t> 2.5 1 </m:t>
+                      </m:r>
+                      <m:r>
+                        <a:rPr lang="en-US" sz="1400" b="0" i="1" smtClean="0">
+                          <a:latin typeface="Cambria Math" panose="02040503050406030204" pitchFamily="18" charset="0"/>
+                        </a:rPr>
+                        <m:t>h𝑜𝑢𝑟</m:t>
+                      </m:r>
+                      <m:r>
+                        <a:rPr lang="en-US" sz="1400" b="0" i="1" smtClean="0">
+                          <a:latin typeface="Cambria Math" panose="02040503050406030204" pitchFamily="18" charset="0"/>
+                        </a:rPr>
+                        <m:t>= </m:t>
+                      </m:r>
+                      <m:f>
+                        <m:fPr>
+                          <m:ctrlPr>
+                            <a:rPr lang="en-US" sz="1400" b="0" i="1" smtClean="0">
+                              <a:latin typeface="Cambria Math" panose="02040503050406030204" pitchFamily="18" charset="0"/>
+                            </a:rPr>
+                          </m:ctrlPr>
+                        </m:fPr>
+                        <m:num>
+                          <m:r>
+                            <a:rPr lang="en-US" sz="1400" b="0" i="1" smtClean="0">
+                              <a:latin typeface="Cambria Math" panose="02040503050406030204" pitchFamily="18" charset="0"/>
+                            </a:rPr>
+                            <m:t>1</m:t>
+                          </m:r>
+                        </m:num>
+                        <m:den>
+                          <m:r>
+                            <a:rPr lang="en-US" sz="1400" b="0" i="1" smtClean="0">
+                              <a:latin typeface="Cambria Math" panose="02040503050406030204" pitchFamily="18" charset="0"/>
+                            </a:rPr>
+                            <m:t>8,760</m:t>
+                          </m:r>
+                        </m:den>
+                      </m:f>
+                      <m:nary>
+                        <m:naryPr>
+                          <m:chr m:val="∑"/>
+                          <m:ctrlPr>
+                            <a:rPr lang="en-US" sz="1400" b="0" i="1" smtClean="0">
+                              <a:latin typeface="Cambria Math" panose="02040503050406030204" pitchFamily="18" charset="0"/>
+                            </a:rPr>
+                          </m:ctrlPr>
+                        </m:naryPr>
+                        <m:sub>
+                          <m:r>
+                            <m:rPr>
+                              <m:brk m:alnAt="23"/>
+                            </m:rPr>
+                            <a:rPr lang="en-US" sz="1400" b="0" i="1" smtClean="0">
+                              <a:latin typeface="Cambria Math" panose="02040503050406030204" pitchFamily="18" charset="0"/>
+                            </a:rPr>
+                            <m:t>𝑖</m:t>
+                          </m:r>
+                          <m:r>
+                            <a:rPr lang="en-US" sz="1400" b="0" i="1" smtClean="0">
+                              <a:latin typeface="Cambria Math" panose="02040503050406030204" pitchFamily="18" charset="0"/>
+                            </a:rPr>
+                            <m:t>=1</m:t>
+                          </m:r>
+                        </m:sub>
+                        <m:sup>
+                          <m:r>
+                            <a:rPr lang="en-US" sz="1400" b="0" i="1" smtClean="0">
+                              <a:latin typeface="Cambria Math" panose="02040503050406030204" pitchFamily="18" charset="0"/>
+                            </a:rPr>
+                            <m:t>8,760</m:t>
+                          </m:r>
+                        </m:sup>
+                        <m:e>
+                          <m:r>
+                            <a:rPr lang="en-US" sz="1400" b="0" i="1" smtClean="0">
+                              <a:latin typeface="Cambria Math" panose="02040503050406030204" pitchFamily="18" charset="0"/>
+                            </a:rPr>
+                            <m:t>𝑃𝑀</m:t>
+                          </m:r>
+                          <m:r>
+                            <a:rPr lang="en-US" sz="1400" b="0" i="1" smtClean="0">
+                              <a:latin typeface="Cambria Math" panose="02040503050406030204" pitchFamily="18" charset="0"/>
+                            </a:rPr>
+                            <m:t>2.5(</m:t>
+                          </m:r>
+                          <m:r>
+                            <a:rPr lang="en-US" sz="1400" b="0" i="1" smtClean="0">
+                              <a:latin typeface="Cambria Math" panose="02040503050406030204" pitchFamily="18" charset="0"/>
+                            </a:rPr>
+                            <m:t>𝑚𝑒𝑎𝑠𝑢𝑟𝑒𝑑</m:t>
+                          </m:r>
+                          <m:r>
+                            <a:rPr lang="en-US" sz="1400" b="0" i="1" smtClean="0">
+                              <a:latin typeface="Cambria Math" panose="02040503050406030204" pitchFamily="18" charset="0"/>
+                            </a:rPr>
+                            <m:t> </m:t>
+                          </m:r>
+                          <m:r>
+                            <a:rPr lang="en-US" sz="1400" b="0" i="1" smtClean="0">
+                              <a:latin typeface="Cambria Math" panose="02040503050406030204" pitchFamily="18" charset="0"/>
+                            </a:rPr>
+                            <m:t>𝑒𝑣𝑒𝑟𝑦</m:t>
+                          </m:r>
+                          <m:r>
+                            <a:rPr lang="en-US" sz="1400" b="0" i="1" smtClean="0">
+                              <a:latin typeface="Cambria Math" panose="02040503050406030204" pitchFamily="18" charset="0"/>
+                            </a:rPr>
+                            <m:t> </m:t>
+                          </m:r>
+                          <m:r>
+                            <a:rPr lang="en-US" sz="1400" b="0" i="1" smtClean="0">
+                              <a:latin typeface="Cambria Math" panose="02040503050406030204" pitchFamily="18" charset="0"/>
+                            </a:rPr>
+                            <m:t>h𝑜𝑢𝑟</m:t>
+                          </m:r>
+                          <m:r>
+                            <a:rPr lang="en-US" sz="1400" b="0" i="1" smtClean="0">
+                              <a:latin typeface="Cambria Math" panose="02040503050406030204" pitchFamily="18" charset="0"/>
+                            </a:rPr>
+                            <m:t>)</m:t>
+                          </m:r>
+                        </m:e>
+                      </m:nary>
+                    </m:oMath>
+                  </m:oMathPara>
+                </a14:m>
+                <a:endParaRPr lang="en-US" sz="1600" dirty="0"/>
+              </a:p>
+            </p:txBody>
+          </p:sp>
+        </mc:Choice>
+        <mc:Fallback>
+          <p:sp>
+            <p:nvSpPr>
+              <p:cNvPr id="10" name="TextBox 9">
+                <a:extLst>
+                  <a:ext uri="{FF2B5EF4-FFF2-40B4-BE49-F238E27FC236}">
+                    <a16:creationId xmlns:a16="http://schemas.microsoft.com/office/drawing/2014/main" id="{0EB3CA63-E32D-1A47-AA9B-3F34F66172E7}"/>
+                  </a:ext>
+                </a:extLst>
+              </p:cNvPr>
+              <p:cNvSpPr txBox="1">
+                <a:spLocks noRot="1" noChangeAspect="1" noMove="1" noResize="1" noEditPoints="1" noAdjustHandles="1" noChangeArrowheads="1" noChangeShapeType="1" noTextEdit="1"/>
+              </p:cNvSpPr>
+              <p:nvPr/>
+            </p:nvSpPr>
+            <p:spPr>
+              <a:xfrm>
+                <a:off x="7192967" y="4200855"/>
+                <a:ext cx="4637103" cy="605679"/>
+              </a:xfrm>
+              <a:prstGeom prst="rect">
+                <a:avLst/>
+              </a:prstGeom>
+              <a:blipFill>
+                <a:blip r:embed="rId4"/>
+                <a:stretch>
+                  <a:fillRect l="-272" t="-114583" r="-817" b="-181250"/>
+                </a:stretch>
+              </a:blipFill>
+            </p:spPr>
+            <p:txBody>
+              <a:bodyPr/>
+              <a:lstStyle/>
+              <a:p>
+                <a:r>
+                  <a:rPr lang="en-US">
+                    <a:noFill/>
+                  </a:rPr>
+                  <a:t> </a:t>
+                </a:r>
+              </a:p>
+            </p:txBody>
+          </p:sp>
+        </mc:Fallback>
+      </mc:AlternateContent>
+      <mc:AlternateContent xmlns:mc="http://schemas.openxmlformats.org/markup-compatibility/2006">
+        <mc:Choice xmlns:a14="http://schemas.microsoft.com/office/drawing/2010/main" Requires="a14">
+          <p:sp>
+            <p:nvSpPr>
+              <p:cNvPr id="11" name="TextBox 10">
+                <a:extLst>
+                  <a:ext uri="{FF2B5EF4-FFF2-40B4-BE49-F238E27FC236}">
+                    <a16:creationId xmlns:a16="http://schemas.microsoft.com/office/drawing/2014/main" id="{B67FD907-156A-864A-B144-95C9988B3E77}"/>
+                  </a:ext>
+                </a:extLst>
+              </p:cNvPr>
+              <p:cNvSpPr txBox="1"/>
+              <p:nvPr/>
+            </p:nvSpPr>
+            <p:spPr>
+              <a:xfrm>
+                <a:off x="6774676" y="5069776"/>
+                <a:ext cx="5405903" cy="633122"/>
+              </a:xfrm>
+              <a:prstGeom prst="rect">
+                <a:avLst/>
+              </a:prstGeom>
+              <a:noFill/>
+            </p:spPr>
+            <p:txBody>
+              <a:bodyPr wrap="none" lIns="0" tIns="0" rIns="0" bIns="0" rtlCol="0">
+                <a:spAutoFit/>
+              </a:bodyPr>
+              <a:lstStyle/>
+              <a:p>
+                <a14:m>
+                  <m:oMathPara xmlns:m="http://schemas.openxmlformats.org/officeDocument/2006/math">
+                    <m:oMathParaPr>
+                      <m:jc m:val="centerGroup"/>
+                    </m:oMathParaPr>
+                    <m:oMath xmlns:m="http://schemas.openxmlformats.org/officeDocument/2006/math">
+                      <m:r>
+                        <a:rPr lang="en-US" sz="1400" b="0" i="1" smtClean="0">
+                          <a:latin typeface="Cambria Math" panose="02040503050406030204" pitchFamily="18" charset="0"/>
+                        </a:rPr>
+                        <m:t>𝑃𝑀</m:t>
+                      </m:r>
+                      <m:r>
+                        <a:rPr lang="en-US" sz="1400" b="0" i="1" smtClean="0">
+                          <a:latin typeface="Cambria Math" panose="02040503050406030204" pitchFamily="18" charset="0"/>
+                        </a:rPr>
+                        <m:t> 2.5 24 </m:t>
+                      </m:r>
+                      <m:r>
+                        <a:rPr lang="en-US" sz="1400" b="0" i="1" smtClean="0">
+                          <a:latin typeface="Cambria Math" panose="02040503050406030204" pitchFamily="18" charset="0"/>
+                        </a:rPr>
+                        <m:t>h𝑜𝑢𝑟</m:t>
+                      </m:r>
+                      <m:r>
+                        <a:rPr lang="en-US" sz="1400" b="0" i="1" smtClean="0">
+                          <a:latin typeface="Cambria Math" panose="02040503050406030204" pitchFamily="18" charset="0"/>
+                        </a:rPr>
+                        <m:t> </m:t>
+                      </m:r>
+                      <m:r>
+                        <a:rPr lang="en-US" sz="1400" b="0" i="1" smtClean="0">
+                          <a:latin typeface="Cambria Math" panose="02040503050406030204" pitchFamily="18" charset="0"/>
+                        </a:rPr>
+                        <m:t>𝑏𝑢𝑙𝑘</m:t>
+                      </m:r>
+                      <m:r>
+                        <a:rPr lang="en-US" sz="1400" b="0" i="1" smtClean="0">
+                          <a:latin typeface="Cambria Math" panose="02040503050406030204" pitchFamily="18" charset="0"/>
+                        </a:rPr>
+                        <m:t>= </m:t>
+                      </m:r>
+                      <m:f>
+                        <m:fPr>
+                          <m:ctrlPr>
+                            <a:rPr lang="en-US" sz="1400" b="0" i="1" smtClean="0">
+                              <a:latin typeface="Cambria Math" panose="02040503050406030204" pitchFamily="18" charset="0"/>
+                            </a:rPr>
+                          </m:ctrlPr>
+                        </m:fPr>
+                        <m:num>
+                          <m:r>
+                            <a:rPr lang="en-US" sz="1400" b="0" i="1" smtClean="0">
+                              <a:latin typeface="Cambria Math" panose="02040503050406030204" pitchFamily="18" charset="0"/>
+                            </a:rPr>
+                            <m:t>1</m:t>
+                          </m:r>
+                        </m:num>
+                        <m:den>
+                          <m:r>
+                            <a:rPr lang="en-US" sz="1400" b="0" i="1" smtClean="0">
+                              <a:latin typeface="Cambria Math" panose="02040503050406030204" pitchFamily="18" charset="0"/>
+                            </a:rPr>
+                            <m:t>365</m:t>
+                          </m:r>
+                        </m:den>
+                      </m:f>
+                      <m:nary>
+                        <m:naryPr>
+                          <m:chr m:val="∑"/>
+                          <m:ctrlPr>
+                            <a:rPr lang="en-US" sz="1400" b="0" i="1" smtClean="0">
+                              <a:latin typeface="Cambria Math" panose="02040503050406030204" pitchFamily="18" charset="0"/>
+                            </a:rPr>
+                          </m:ctrlPr>
+                        </m:naryPr>
+                        <m:sub>
+                          <m:r>
+                            <m:rPr>
+                              <m:brk m:alnAt="23"/>
+                            </m:rPr>
+                            <a:rPr lang="en-US" sz="1400" b="0" i="1" smtClean="0">
+                              <a:latin typeface="Cambria Math" panose="02040503050406030204" pitchFamily="18" charset="0"/>
+                            </a:rPr>
+                            <m:t>𝑖</m:t>
+                          </m:r>
+                          <m:r>
+                            <a:rPr lang="en-US" sz="1400" b="0" i="1" smtClean="0">
+                              <a:latin typeface="Cambria Math" panose="02040503050406030204" pitchFamily="18" charset="0"/>
+                            </a:rPr>
+                            <m:t>=1</m:t>
+                          </m:r>
+                        </m:sub>
+                        <m:sup>
+                          <m:r>
+                            <a:rPr lang="en-US" sz="1400" b="0" i="1" smtClean="0">
+                              <a:latin typeface="Cambria Math" panose="02040503050406030204" pitchFamily="18" charset="0"/>
+                            </a:rPr>
+                            <m:t>365</m:t>
+                          </m:r>
+                        </m:sup>
+                        <m:e>
+                          <m:f>
+                            <m:fPr>
+                              <m:ctrlPr>
+                                <a:rPr lang="en-US" sz="1400" b="0" i="1" smtClean="0">
+                                  <a:latin typeface="Cambria Math" panose="02040503050406030204" pitchFamily="18" charset="0"/>
+                                </a:rPr>
+                              </m:ctrlPr>
+                            </m:fPr>
+                            <m:num>
+                              <m:r>
+                                <a:rPr lang="en-US" sz="1400" b="0" i="1" smtClean="0">
+                                  <a:latin typeface="Cambria Math" panose="02040503050406030204" pitchFamily="18" charset="0"/>
+                                </a:rPr>
+                                <m:t>1</m:t>
+                              </m:r>
+                            </m:num>
+                            <m:den>
+                              <m:r>
+                                <a:rPr lang="en-US" sz="1400" b="0" i="1" smtClean="0">
+                                  <a:latin typeface="Cambria Math" panose="02040503050406030204" pitchFamily="18" charset="0"/>
+                                </a:rPr>
+                                <m:t>24</m:t>
+                              </m:r>
+                            </m:den>
+                          </m:f>
+                          <m:nary>
+                            <m:naryPr>
+                              <m:chr m:val="∑"/>
+                              <m:ctrlPr>
+                                <a:rPr lang="en-US" sz="1400" b="0" i="1" smtClean="0">
+                                  <a:latin typeface="Cambria Math" panose="02040503050406030204" pitchFamily="18" charset="0"/>
+                                </a:rPr>
+                              </m:ctrlPr>
+                            </m:naryPr>
+                            <m:sub>
+                              <m:r>
+                                <m:rPr>
+                                  <m:brk m:alnAt="23"/>
+                                </m:rPr>
+                                <a:rPr lang="en-US" sz="1400" b="0" i="1" smtClean="0">
+                                  <a:latin typeface="Cambria Math" panose="02040503050406030204" pitchFamily="18" charset="0"/>
+                                </a:rPr>
+                                <m:t>𝑗</m:t>
+                              </m:r>
+                              <m:r>
+                                <a:rPr lang="en-US" sz="1400" b="0" i="1" smtClean="0">
+                                  <a:latin typeface="Cambria Math" panose="02040503050406030204" pitchFamily="18" charset="0"/>
+                                </a:rPr>
+                                <m:t>=1</m:t>
+                              </m:r>
+                            </m:sub>
+                            <m:sup>
+                              <m:r>
+                                <a:rPr lang="en-US" sz="1400" b="0" i="1" smtClean="0">
+                                  <a:latin typeface="Cambria Math" panose="02040503050406030204" pitchFamily="18" charset="0"/>
+                                </a:rPr>
+                                <m:t>24</m:t>
+                              </m:r>
+                            </m:sup>
+                            <m:e>
+                              <m:r>
+                                <a:rPr lang="en-US" sz="1400" i="1">
+                                  <a:latin typeface="Cambria Math" panose="02040503050406030204" pitchFamily="18" charset="0"/>
+                                </a:rPr>
+                                <m:t>𝑃𝑀</m:t>
+                              </m:r>
+                              <m:r>
+                                <a:rPr lang="en-US" sz="1400" i="1">
+                                  <a:latin typeface="Cambria Math" panose="02040503050406030204" pitchFamily="18" charset="0"/>
+                                </a:rPr>
+                                <m:t>2.5(</m:t>
+                              </m:r>
+                              <m:r>
+                                <a:rPr lang="en-US" sz="1400" i="1">
+                                  <a:latin typeface="Cambria Math" panose="02040503050406030204" pitchFamily="18" charset="0"/>
+                                </a:rPr>
+                                <m:t>𝑚𝑒𝑎𝑠𝑢𝑟𝑒𝑑</m:t>
+                              </m:r>
+                              <m:r>
+                                <a:rPr lang="en-US" sz="1400" i="1">
+                                  <a:latin typeface="Cambria Math" panose="02040503050406030204" pitchFamily="18" charset="0"/>
+                                </a:rPr>
+                                <m:t> </m:t>
+                              </m:r>
+                              <m:r>
+                                <a:rPr lang="en-US" sz="1400" i="1">
+                                  <a:latin typeface="Cambria Math" panose="02040503050406030204" pitchFamily="18" charset="0"/>
+                                </a:rPr>
+                                <m:t>𝑒𝑣𝑒𝑟𝑦</m:t>
+                              </m:r>
+                              <m:r>
+                                <a:rPr lang="en-US" sz="1400" i="1">
+                                  <a:latin typeface="Cambria Math" panose="02040503050406030204" pitchFamily="18" charset="0"/>
+                                </a:rPr>
+                                <m:t> </m:t>
+                              </m:r>
+                              <m:r>
+                                <a:rPr lang="en-US" sz="1400" i="1">
+                                  <a:latin typeface="Cambria Math" panose="02040503050406030204" pitchFamily="18" charset="0"/>
+                                </a:rPr>
+                                <m:t>h𝑜𝑢𝑟</m:t>
+                              </m:r>
+                              <m:r>
+                                <a:rPr lang="en-US" sz="1400" i="1">
+                                  <a:latin typeface="Cambria Math" panose="02040503050406030204" pitchFamily="18" charset="0"/>
+                                </a:rPr>
+                                <m:t>)</m:t>
+                              </m:r>
+                            </m:e>
+                          </m:nary>
+                        </m:e>
+                      </m:nary>
+                    </m:oMath>
+                  </m:oMathPara>
+                </a14:m>
+                <a:endParaRPr lang="en-US" dirty="0"/>
+              </a:p>
+            </p:txBody>
+          </p:sp>
+        </mc:Choice>
+        <mc:Fallback>
+          <p:sp>
+            <p:nvSpPr>
+              <p:cNvPr id="11" name="TextBox 10">
+                <a:extLst>
+                  <a:ext uri="{FF2B5EF4-FFF2-40B4-BE49-F238E27FC236}">
+                    <a16:creationId xmlns:a16="http://schemas.microsoft.com/office/drawing/2014/main" id="{B67FD907-156A-864A-B144-95C9988B3E77}"/>
+                  </a:ext>
+                </a:extLst>
+              </p:cNvPr>
+              <p:cNvSpPr txBox="1">
+                <a:spLocks noRot="1" noChangeAspect="1" noMove="1" noResize="1" noEditPoints="1" noAdjustHandles="1" noChangeArrowheads="1" noChangeShapeType="1" noTextEdit="1"/>
+              </p:cNvSpPr>
+              <p:nvPr/>
+            </p:nvSpPr>
+            <p:spPr>
+              <a:xfrm>
+                <a:off x="6774676" y="5069776"/>
+                <a:ext cx="5405903" cy="633122"/>
+              </a:xfrm>
+              <a:prstGeom prst="rect">
+                <a:avLst/>
+              </a:prstGeom>
+              <a:blipFill>
+                <a:blip r:embed="rId5"/>
+                <a:stretch>
+                  <a:fillRect t="-103922" r="-703" b="-166667"/>
+                </a:stretch>
+              </a:blipFill>
+            </p:spPr>
+            <p:txBody>
+              <a:bodyPr/>
+              <a:lstStyle/>
+              <a:p>
+                <a:r>
+                  <a:rPr lang="en-US">
+                    <a:noFill/>
+                  </a:rPr>
+                  <a:t> </a:t>
+                </a:r>
+              </a:p>
+            </p:txBody>
+          </p:sp>
+        </mc:Fallback>
+      </mc:AlternateContent>
+      <mc:AlternateContent xmlns:mc="http://schemas.openxmlformats.org/markup-compatibility/2006">
+        <mc:Choice xmlns:a14="http://schemas.microsoft.com/office/drawing/2010/main" Requires="a14">
+          <p:sp>
+            <p:nvSpPr>
+              <p:cNvPr id="12" name="TextBox 11">
+                <a:extLst>
+                  <a:ext uri="{FF2B5EF4-FFF2-40B4-BE49-F238E27FC236}">
+                    <a16:creationId xmlns:a16="http://schemas.microsoft.com/office/drawing/2014/main" id="{4D01DB2A-4A60-AE41-B0B0-F520E2F09915}"/>
+                  </a:ext>
+                </a:extLst>
+              </p:cNvPr>
+              <p:cNvSpPr txBox="1"/>
+              <p:nvPr/>
+            </p:nvSpPr>
+            <p:spPr>
+              <a:xfrm>
+                <a:off x="7095760" y="5966140"/>
+                <a:ext cx="4831515" cy="608756"/>
+              </a:xfrm>
+              <a:prstGeom prst="rect">
+                <a:avLst/>
+              </a:prstGeom>
+              <a:noFill/>
+            </p:spPr>
+            <p:txBody>
+              <a:bodyPr wrap="none" lIns="0" tIns="0" rIns="0" bIns="0" rtlCol="0">
+                <a:spAutoFit/>
+              </a:bodyPr>
+              <a:lstStyle/>
+              <a:p>
+                <a14:m>
+                  <m:oMathPara xmlns:m="http://schemas.openxmlformats.org/officeDocument/2006/math">
+                    <m:oMathParaPr>
+                      <m:jc m:val="centerGroup"/>
+                    </m:oMathParaPr>
+                    <m:oMath xmlns:m="http://schemas.openxmlformats.org/officeDocument/2006/math">
+                      <m:r>
+                        <a:rPr lang="en-US" sz="1400" b="0" i="1" smtClean="0">
+                          <a:latin typeface="Cambria Math" panose="02040503050406030204" pitchFamily="18" charset="0"/>
+                        </a:rPr>
+                        <m:t>𝑃𝑀</m:t>
+                      </m:r>
+                      <m:r>
+                        <a:rPr lang="en-US" sz="1400" b="0" i="1" smtClean="0">
+                          <a:latin typeface="Cambria Math" panose="02040503050406030204" pitchFamily="18" charset="0"/>
+                        </a:rPr>
+                        <m:t> 2.5 24 </m:t>
+                      </m:r>
+                      <m:r>
+                        <a:rPr lang="en-US" sz="1400" b="0" i="1" smtClean="0">
+                          <a:latin typeface="Cambria Math" panose="02040503050406030204" pitchFamily="18" charset="0"/>
+                        </a:rPr>
+                        <m:t>h𝑜𝑢𝑟</m:t>
+                      </m:r>
+                      <m:r>
+                        <a:rPr lang="en-US" sz="1400" b="0" i="1" smtClean="0">
+                          <a:latin typeface="Cambria Math" panose="02040503050406030204" pitchFamily="18" charset="0"/>
+                        </a:rPr>
+                        <m:t>= </m:t>
+                      </m:r>
+                      <m:f>
+                        <m:fPr>
+                          <m:ctrlPr>
+                            <a:rPr lang="en-US" sz="1400" b="0" i="1" smtClean="0">
+                              <a:latin typeface="Cambria Math" panose="02040503050406030204" pitchFamily="18" charset="0"/>
+                            </a:rPr>
+                          </m:ctrlPr>
+                        </m:fPr>
+                        <m:num>
+                          <m:r>
+                            <a:rPr lang="en-US" sz="1400" b="0" i="1" smtClean="0">
+                              <a:latin typeface="Cambria Math" panose="02040503050406030204" pitchFamily="18" charset="0"/>
+                            </a:rPr>
+                            <m:t>1</m:t>
+                          </m:r>
+                        </m:num>
+                        <m:den>
+                          <m:r>
+                            <a:rPr lang="en-US" sz="1400" b="0" i="1" smtClean="0">
+                              <a:latin typeface="Cambria Math" panose="02040503050406030204" pitchFamily="18" charset="0"/>
+                            </a:rPr>
+                            <m:t>365</m:t>
+                          </m:r>
+                        </m:den>
+                      </m:f>
+                      <m:nary>
+                        <m:naryPr>
+                          <m:chr m:val="∑"/>
+                          <m:ctrlPr>
+                            <a:rPr lang="en-US" sz="1400" b="0" i="1" smtClean="0">
+                              <a:latin typeface="Cambria Math" panose="02040503050406030204" pitchFamily="18" charset="0"/>
+                            </a:rPr>
+                          </m:ctrlPr>
+                        </m:naryPr>
+                        <m:sub>
+                          <m:r>
+                            <m:rPr>
+                              <m:brk m:alnAt="23"/>
+                            </m:rPr>
+                            <a:rPr lang="en-US" sz="1400" b="0" i="1" smtClean="0">
+                              <a:latin typeface="Cambria Math" panose="02040503050406030204" pitchFamily="18" charset="0"/>
+                            </a:rPr>
+                            <m:t>𝑖</m:t>
+                          </m:r>
+                          <m:r>
+                            <a:rPr lang="en-US" sz="1400" b="0" i="1" smtClean="0">
+                              <a:latin typeface="Cambria Math" panose="02040503050406030204" pitchFamily="18" charset="0"/>
+                            </a:rPr>
+                            <m:t>=1</m:t>
+                          </m:r>
+                        </m:sub>
+                        <m:sup>
+                          <m:r>
+                            <a:rPr lang="en-US" sz="1400" b="0" i="1" smtClean="0">
+                              <a:latin typeface="Cambria Math" panose="02040503050406030204" pitchFamily="18" charset="0"/>
+                            </a:rPr>
+                            <m:t>365</m:t>
+                          </m:r>
+                        </m:sup>
+                        <m:e>
+                          <m:r>
+                            <a:rPr lang="en-US" sz="1400" b="0" i="1" smtClean="0">
+                              <a:latin typeface="Cambria Math" panose="02040503050406030204" pitchFamily="18" charset="0"/>
+                            </a:rPr>
+                            <m:t>𝑃𝑀</m:t>
+                          </m:r>
+                          <m:r>
+                            <a:rPr lang="en-US" sz="1400" b="0" i="1" smtClean="0">
+                              <a:latin typeface="Cambria Math" panose="02040503050406030204" pitchFamily="18" charset="0"/>
+                            </a:rPr>
+                            <m:t>2.5(</m:t>
+                          </m:r>
+                          <m:r>
+                            <a:rPr lang="en-US" sz="1400" b="0" i="1" smtClean="0">
+                              <a:latin typeface="Cambria Math" panose="02040503050406030204" pitchFamily="18" charset="0"/>
+                            </a:rPr>
+                            <m:t>𝑚𝑒𝑎𝑠𝑢𝑟𝑒𝑑</m:t>
+                          </m:r>
+                          <m:r>
+                            <a:rPr lang="en-US" sz="1400" b="0" i="1" smtClean="0">
+                              <a:latin typeface="Cambria Math" panose="02040503050406030204" pitchFamily="18" charset="0"/>
+                            </a:rPr>
+                            <m:t> </m:t>
+                          </m:r>
+                          <m:r>
+                            <a:rPr lang="en-US" sz="1400" b="0" i="1" smtClean="0">
+                              <a:latin typeface="Cambria Math" panose="02040503050406030204" pitchFamily="18" charset="0"/>
+                            </a:rPr>
+                            <m:t>𝑒𝑣𝑒𝑟𝑦</m:t>
+                          </m:r>
+                          <m:r>
+                            <a:rPr lang="en-US" sz="1400" b="0" i="1" smtClean="0">
+                              <a:latin typeface="Cambria Math" panose="02040503050406030204" pitchFamily="18" charset="0"/>
+                            </a:rPr>
+                            <m:t> 24 </m:t>
+                          </m:r>
+                          <m:r>
+                            <a:rPr lang="en-US" sz="1400" b="0" i="1" smtClean="0">
+                              <a:latin typeface="Cambria Math" panose="02040503050406030204" pitchFamily="18" charset="0"/>
+                            </a:rPr>
+                            <m:t>h𝑜𝑢𝑟𝑠</m:t>
+                          </m:r>
+                          <m:r>
+                            <a:rPr lang="en-US" sz="1400" b="0" i="1" smtClean="0">
+                              <a:latin typeface="Cambria Math" panose="02040503050406030204" pitchFamily="18" charset="0"/>
+                            </a:rPr>
+                            <m:t>)</m:t>
+                          </m:r>
+                        </m:e>
+                      </m:nary>
+                    </m:oMath>
+                  </m:oMathPara>
+                </a14:m>
+                <a:endParaRPr lang="en-US" sz="1600" dirty="0"/>
+              </a:p>
+            </p:txBody>
+          </p:sp>
+        </mc:Choice>
+        <mc:Fallback>
+          <p:sp>
+            <p:nvSpPr>
+              <p:cNvPr id="12" name="TextBox 11">
+                <a:extLst>
+                  <a:ext uri="{FF2B5EF4-FFF2-40B4-BE49-F238E27FC236}">
+                    <a16:creationId xmlns:a16="http://schemas.microsoft.com/office/drawing/2014/main" id="{4D01DB2A-4A60-AE41-B0B0-F520E2F09915}"/>
+                  </a:ext>
+                </a:extLst>
+              </p:cNvPr>
+              <p:cNvSpPr txBox="1">
+                <a:spLocks noRot="1" noChangeAspect="1" noMove="1" noResize="1" noEditPoints="1" noAdjustHandles="1" noChangeArrowheads="1" noChangeShapeType="1" noTextEdit="1"/>
+              </p:cNvSpPr>
+              <p:nvPr/>
+            </p:nvSpPr>
+            <p:spPr>
+              <a:xfrm>
+                <a:off x="7095760" y="5966140"/>
+                <a:ext cx="4831515" cy="608756"/>
+              </a:xfrm>
+              <a:prstGeom prst="rect">
+                <a:avLst/>
+              </a:prstGeom>
+              <a:blipFill>
+                <a:blip r:embed="rId6"/>
+                <a:stretch>
+                  <a:fillRect l="-262" t="-110204" r="-787" b="-175510"/>
+                </a:stretch>
+              </a:blipFill>
+            </p:spPr>
+            <p:txBody>
+              <a:bodyPr/>
+              <a:lstStyle/>
+              <a:p>
+                <a:r>
+                  <a:rPr lang="en-US">
+                    <a:noFill/>
+                  </a:rPr>
+                  <a:t> </a:t>
+                </a:r>
+              </a:p>
+            </p:txBody>
+          </p:sp>
+        </mc:Fallback>
+      </mc:AlternateContent>
     </p:spTree>
     <p:extLst>
       <p:ext uri="{BB962C8B-B14F-4D97-AF65-F5344CB8AC3E}">
@@ -3500,7 +4281,7 @@
           <p:cNvPr id="2" name="Title 1">
             <a:extLst>
               <a:ext uri="{FF2B5EF4-FFF2-40B4-BE49-F238E27FC236}">
-                <a16:creationId xmlns:a16="http://schemas.microsoft.com/office/drawing/2014/main" id="{829F02E2-7353-934D-B206-11C98811C0BE}"/>
+                <a16:creationId xmlns:a16="http://schemas.microsoft.com/office/drawing/2014/main" id="{88603568-3440-3841-934B-83A39608DE55}"/>
               </a:ext>
             </a:extLst>
           </p:cNvPr>
@@ -3511,80 +4292,869 @@
             <p:ph type="title"/>
           </p:nvPr>
         </p:nvSpPr>
-        <p:spPr/>
+        <p:spPr>
+          <a:xfrm>
+            <a:off x="0" y="0"/>
+            <a:ext cx="10515600" cy="1325563"/>
+          </a:xfrm>
+        </p:spPr>
         <p:txBody>
           <a:bodyPr/>
           <a:lstStyle/>
           <a:p>
             <a:r>
               <a:rPr lang="en-US" dirty="0"/>
-              <a:t>Purple Air Data</a:t>
-            </a:r>
-          </a:p>
-        </p:txBody>
-      </p:sp>
-      <p:sp>
-        <p:nvSpPr>
-          <p:cNvPr id="3" name="Content Placeholder 2">
-            <a:extLst>
-              <a:ext uri="{FF2B5EF4-FFF2-40B4-BE49-F238E27FC236}">
-                <a16:creationId xmlns:a16="http://schemas.microsoft.com/office/drawing/2014/main" id="{9023DD07-DF24-2342-8C14-0DE6E3B2D703}"/>
-              </a:ext>
-            </a:extLst>
-          </p:cNvPr>
-          <p:cNvSpPr>
-            <a:spLocks noGrp="1"/>
-          </p:cNvSpPr>
-          <p:nvPr>
-            <p:ph idx="1"/>
-          </p:nvPr>
-        </p:nvSpPr>
-        <p:spPr/>
-        <p:txBody>
-          <a:bodyPr/>
-          <a:lstStyle/>
-          <a:p>
-            <a:r>
-              <a:rPr lang="en-US" dirty="0"/>
-              <a:t>API (code)</a:t>
-            </a:r>
-          </a:p>
-          <a:p>
-            <a:r>
-              <a:rPr lang="en-US" dirty="0"/>
-              <a:t>Cleaning (code)</a:t>
-            </a:r>
-          </a:p>
-          <a:p>
-            <a:r>
-              <a:rPr lang="en-US" dirty="0"/>
-              <a:t>Plot with outlier</a:t>
-            </a:r>
-          </a:p>
-          <a:p>
-            <a:r>
-              <a:rPr lang="en-US" dirty="0"/>
-              <a:t>Outlier rejection (code)</a:t>
-            </a:r>
-          </a:p>
-          <a:p>
-            <a:r>
-              <a:rPr lang="en-US" dirty="0"/>
-              <a:t>Plot without outlier and with regression</a:t>
-            </a:r>
-          </a:p>
-        </p:txBody>
-      </p:sp>
+              <a:t>Purple Air Data – API request</a:t>
+            </a:r>
+          </a:p>
+        </p:txBody>
+      </p:sp>
+      <p:pic>
+        <p:nvPicPr>
+          <p:cNvPr id="5" name="Picture 4">
+            <a:extLst>
+              <a:ext uri="{FF2B5EF4-FFF2-40B4-BE49-F238E27FC236}">
+                <a16:creationId xmlns:a16="http://schemas.microsoft.com/office/drawing/2014/main" id="{20FB4A01-1A00-BA4C-AAC5-4D5C088A6073}"/>
+              </a:ext>
+            </a:extLst>
+          </p:cNvPr>
+          <p:cNvPicPr>
+            <a:picLocks noChangeAspect="1"/>
+          </p:cNvPicPr>
+          <p:nvPr/>
+        </p:nvPicPr>
+        <p:blipFill>
+          <a:blip r:embed="rId2"/>
+          <a:stretch>
+            <a:fillRect/>
+          </a:stretch>
+        </p:blipFill>
+        <p:spPr>
+          <a:xfrm>
+            <a:off x="111841" y="1376132"/>
+            <a:ext cx="6963987" cy="5177065"/>
+          </a:xfrm>
+          <a:prstGeom prst="rect">
+            <a:avLst/>
+          </a:prstGeom>
+        </p:spPr>
+      </p:pic>
+      <p:pic>
+        <p:nvPicPr>
+          <p:cNvPr id="6" name="Picture 5">
+            <a:extLst>
+              <a:ext uri="{FF2B5EF4-FFF2-40B4-BE49-F238E27FC236}">
+                <a16:creationId xmlns:a16="http://schemas.microsoft.com/office/drawing/2014/main" id="{D55D72B4-8262-0447-9190-3B47361BCCDC}"/>
+              </a:ext>
+            </a:extLst>
+          </p:cNvPr>
+          <p:cNvPicPr>
+            <a:picLocks noChangeAspect="1"/>
+          </p:cNvPicPr>
+          <p:nvPr/>
+        </p:nvPicPr>
+        <p:blipFill>
+          <a:blip r:embed="rId3"/>
+          <a:stretch>
+            <a:fillRect/>
+          </a:stretch>
+        </p:blipFill>
+        <p:spPr>
+          <a:xfrm>
+            <a:off x="5420178" y="1094921"/>
+            <a:ext cx="6482070" cy="2965450"/>
+          </a:xfrm>
+          <a:prstGeom prst="rect">
+            <a:avLst/>
+          </a:prstGeom>
+        </p:spPr>
+      </p:pic>
     </p:spTree>
     <p:extLst>
       <p:ext uri="{BB962C8B-B14F-4D97-AF65-F5344CB8AC3E}">
-        <p14:creationId xmlns:p14="http://schemas.microsoft.com/office/powerpoint/2010/main" val="1225871901"/>
+        <p14:creationId xmlns:p14="http://schemas.microsoft.com/office/powerpoint/2010/main" val="2721827281"/>
       </p:ext>
     </p:extLst>
   </p:cSld>
   <p:clrMapOvr>
     <a:masterClrMapping/>
   </p:clrMapOvr>
+</p:sld>
+</file>
+
+<file path=ppt/slides/slide4.xml><?xml version="1.0" encoding="utf-8"?>
+<p:sld xmlns:a="http://schemas.openxmlformats.org/drawingml/2006/main" xmlns:r="http://schemas.openxmlformats.org/officeDocument/2006/relationships" xmlns:p="http://schemas.openxmlformats.org/presentationml/2006/main">
+  <p:cSld>
+    <p:spTree>
+      <p:nvGrpSpPr>
+        <p:cNvPr id="1" name=""/>
+        <p:cNvGrpSpPr/>
+        <p:nvPr/>
+      </p:nvGrpSpPr>
+      <p:grpSpPr>
+        <a:xfrm>
+          <a:off x="0" y="0"/>
+          <a:ext cx="0" cy="0"/>
+          <a:chOff x="0" y="0"/>
+          <a:chExt cx="0" cy="0"/>
+        </a:xfrm>
+      </p:grpSpPr>
+      <p:sp>
+        <p:nvSpPr>
+          <p:cNvPr id="2" name="Title 1">
+            <a:extLst>
+              <a:ext uri="{FF2B5EF4-FFF2-40B4-BE49-F238E27FC236}">
+                <a16:creationId xmlns:a16="http://schemas.microsoft.com/office/drawing/2014/main" id="{88603568-3440-3841-934B-83A39608DE55}"/>
+              </a:ext>
+            </a:extLst>
+          </p:cNvPr>
+          <p:cNvSpPr>
+            <a:spLocks noGrp="1"/>
+          </p:cNvSpPr>
+          <p:nvPr>
+            <p:ph type="title"/>
+          </p:nvPr>
+        </p:nvSpPr>
+        <p:spPr>
+          <a:xfrm>
+            <a:off x="0" y="0"/>
+            <a:ext cx="10515600" cy="1325563"/>
+          </a:xfrm>
+        </p:spPr>
+        <p:txBody>
+          <a:bodyPr/>
+          <a:lstStyle/>
+          <a:p>
+            <a:r>
+              <a:rPr lang="en-US" dirty="0"/>
+              <a:t>Purple Air Data – data cleaning</a:t>
+            </a:r>
+          </a:p>
+        </p:txBody>
+      </p:sp>
+      <p:pic>
+        <p:nvPicPr>
+          <p:cNvPr id="7" name="Picture 6">
+            <a:extLst>
+              <a:ext uri="{FF2B5EF4-FFF2-40B4-BE49-F238E27FC236}">
+                <a16:creationId xmlns:a16="http://schemas.microsoft.com/office/drawing/2014/main" id="{7EDC4F9B-D3E0-A746-A198-39360D259326}"/>
+              </a:ext>
+            </a:extLst>
+          </p:cNvPr>
+          <p:cNvPicPr>
+            <a:picLocks noChangeAspect="1"/>
+          </p:cNvPicPr>
+          <p:nvPr/>
+        </p:nvPicPr>
+        <p:blipFill>
+          <a:blip r:embed="rId2"/>
+          <a:stretch>
+            <a:fillRect/>
+          </a:stretch>
+        </p:blipFill>
+        <p:spPr>
+          <a:xfrm>
+            <a:off x="295729" y="1124856"/>
+            <a:ext cx="9118600" cy="1778000"/>
+          </a:xfrm>
+          <a:prstGeom prst="rect">
+            <a:avLst/>
+          </a:prstGeom>
+        </p:spPr>
+      </p:pic>
+      <p:pic>
+        <p:nvPicPr>
+          <p:cNvPr id="8" name="Picture 7">
+            <a:extLst>
+              <a:ext uri="{FF2B5EF4-FFF2-40B4-BE49-F238E27FC236}">
+                <a16:creationId xmlns:a16="http://schemas.microsoft.com/office/drawing/2014/main" id="{3EA6ED64-E5C8-604B-ACA5-1712CB236866}"/>
+              </a:ext>
+            </a:extLst>
+          </p:cNvPr>
+          <p:cNvPicPr>
+            <a:picLocks noChangeAspect="1"/>
+          </p:cNvPicPr>
+          <p:nvPr/>
+        </p:nvPicPr>
+        <p:blipFill rotWithShape="1">
+          <a:blip r:embed="rId3"/>
+          <a:srcRect t="12422"/>
+          <a:stretch/>
+        </p:blipFill>
+        <p:spPr>
+          <a:xfrm>
+            <a:off x="985158" y="3429000"/>
+            <a:ext cx="10553700" cy="2558142"/>
+          </a:xfrm>
+          <a:prstGeom prst="rect">
+            <a:avLst/>
+          </a:prstGeom>
+        </p:spPr>
+      </p:pic>
+      <p:pic>
+        <p:nvPicPr>
+          <p:cNvPr id="4" name="Picture 3">
+            <a:extLst>
+              <a:ext uri="{FF2B5EF4-FFF2-40B4-BE49-F238E27FC236}">
+                <a16:creationId xmlns:a16="http://schemas.microsoft.com/office/drawing/2014/main" id="{0E216817-614C-E649-B143-941A6510948F}"/>
+              </a:ext>
+            </a:extLst>
+          </p:cNvPr>
+          <p:cNvPicPr>
+            <a:picLocks noChangeAspect="1"/>
+          </p:cNvPicPr>
+          <p:nvPr/>
+        </p:nvPicPr>
+        <p:blipFill>
+          <a:blip r:embed="rId4"/>
+          <a:stretch>
+            <a:fillRect/>
+          </a:stretch>
+        </p:blipFill>
+        <p:spPr>
+          <a:xfrm>
+            <a:off x="1746581" y="1325563"/>
+            <a:ext cx="7963477" cy="4990193"/>
+          </a:xfrm>
+          <a:prstGeom prst="rect">
+            <a:avLst/>
+          </a:prstGeom>
+        </p:spPr>
+      </p:pic>
+    </p:spTree>
+    <p:extLst>
+      <p:ext uri="{BB962C8B-B14F-4D97-AF65-F5344CB8AC3E}">
+        <p14:creationId xmlns:p14="http://schemas.microsoft.com/office/powerpoint/2010/main" val="2618399681"/>
+      </p:ext>
+    </p:extLst>
+  </p:cSld>
+  <p:clrMapOvr>
+    <a:masterClrMapping/>
+  </p:clrMapOvr>
+  <p:timing>
+    <p:tnLst>
+      <p:par>
+        <p:cTn id="1" dur="indefinite" restart="never" nodeType="tmRoot">
+          <p:childTnLst>
+            <p:seq concurrent="1" nextAc="seek">
+              <p:cTn id="2" dur="indefinite" nodeType="mainSeq">
+                <p:childTnLst>
+                  <p:par>
+                    <p:cTn id="3" fill="hold">
+                      <p:stCondLst>
+                        <p:cond delay="indefinite"/>
+                      </p:stCondLst>
+                      <p:childTnLst>
+                        <p:par>
+                          <p:cTn id="4" fill="hold">
+                            <p:stCondLst>
+                              <p:cond delay="0"/>
+                            </p:stCondLst>
+                            <p:childTnLst>
+                              <p:par>
+                                <p:cTn id="5" presetID="1" presetClass="entr" presetSubtype="0" fill="hold" nodeType="clickEffect">
+                                  <p:stCondLst>
+                                    <p:cond delay="0"/>
+                                  </p:stCondLst>
+                                  <p:childTnLst>
+                                    <p:set>
+                                      <p:cBhvr>
+                                        <p:cTn id="6" dur="1" fill="hold">
+                                          <p:stCondLst>
+                                            <p:cond delay="0"/>
+                                          </p:stCondLst>
+                                        </p:cTn>
+                                        <p:tgtEl>
+                                          <p:spTgt spid="7"/>
+                                        </p:tgtEl>
+                                        <p:attrNameLst>
+                                          <p:attrName>style.visibility</p:attrName>
+                                        </p:attrNameLst>
+                                      </p:cBhvr>
+                                      <p:to>
+                                        <p:strVal val="visible"/>
+                                      </p:to>
+                                    </p:set>
+                                  </p:childTnLst>
+                                </p:cTn>
+                              </p:par>
+                            </p:childTnLst>
+                          </p:cTn>
+                        </p:par>
+                      </p:childTnLst>
+                    </p:cTn>
+                  </p:par>
+                  <p:par>
+                    <p:cTn id="7" fill="hold">
+                      <p:stCondLst>
+                        <p:cond delay="indefinite"/>
+                      </p:stCondLst>
+                      <p:childTnLst>
+                        <p:par>
+                          <p:cTn id="8" fill="hold">
+                            <p:stCondLst>
+                              <p:cond delay="0"/>
+                            </p:stCondLst>
+                            <p:childTnLst>
+                              <p:par>
+                                <p:cTn id="9" presetID="1" presetClass="entr" presetSubtype="0" fill="hold" nodeType="clickEffect">
+                                  <p:stCondLst>
+                                    <p:cond delay="0"/>
+                                  </p:stCondLst>
+                                  <p:childTnLst>
+                                    <p:set>
+                                      <p:cBhvr>
+                                        <p:cTn id="10" dur="1" fill="hold">
+                                          <p:stCondLst>
+                                            <p:cond delay="0"/>
+                                          </p:stCondLst>
+                                        </p:cTn>
+                                        <p:tgtEl>
+                                          <p:spTgt spid="8"/>
+                                        </p:tgtEl>
+                                        <p:attrNameLst>
+                                          <p:attrName>style.visibility</p:attrName>
+                                        </p:attrNameLst>
+                                      </p:cBhvr>
+                                      <p:to>
+                                        <p:strVal val="visible"/>
+                                      </p:to>
+                                    </p:set>
+                                  </p:childTnLst>
+                                </p:cTn>
+                              </p:par>
+                            </p:childTnLst>
+                          </p:cTn>
+                        </p:par>
+                      </p:childTnLst>
+                    </p:cTn>
+                  </p:par>
+                  <p:par>
+                    <p:cTn id="11" fill="hold">
+                      <p:stCondLst>
+                        <p:cond delay="indefinite"/>
+                      </p:stCondLst>
+                      <p:childTnLst>
+                        <p:par>
+                          <p:cTn id="12" fill="hold">
+                            <p:stCondLst>
+                              <p:cond delay="0"/>
+                            </p:stCondLst>
+                            <p:childTnLst>
+                              <p:par>
+                                <p:cTn id="13" presetID="1" presetClass="entr" presetSubtype="0" fill="hold" nodeType="clickEffect">
+                                  <p:stCondLst>
+                                    <p:cond delay="0"/>
+                                  </p:stCondLst>
+                                  <p:childTnLst>
+                                    <p:set>
+                                      <p:cBhvr>
+                                        <p:cTn id="14" dur="1" fill="hold">
+                                          <p:stCondLst>
+                                            <p:cond delay="0"/>
+                                          </p:stCondLst>
+                                        </p:cTn>
+                                        <p:tgtEl>
+                                          <p:spTgt spid="4"/>
+                                        </p:tgtEl>
+                                        <p:attrNameLst>
+                                          <p:attrName>style.visibility</p:attrName>
+                                        </p:attrNameLst>
+                                      </p:cBhvr>
+                                      <p:to>
+                                        <p:strVal val="visible"/>
+                                      </p:to>
+                                    </p:set>
+                                  </p:childTnLst>
+                                </p:cTn>
+                              </p:par>
+                            </p:childTnLst>
+                          </p:cTn>
+                        </p:par>
+                      </p:childTnLst>
+                    </p:cTn>
+                  </p:par>
+                </p:childTnLst>
+              </p:cTn>
+              <p:prevCondLst>
+                <p:cond evt="onPrev" delay="0">
+                  <p:tgtEl>
+                    <p:sldTgt/>
+                  </p:tgtEl>
+                </p:cond>
+              </p:prevCondLst>
+              <p:nextCondLst>
+                <p:cond evt="onNext" delay="0">
+                  <p:tgtEl>
+                    <p:sldTgt/>
+                  </p:tgtEl>
+                </p:cond>
+              </p:nextCondLst>
+            </p:seq>
+          </p:childTnLst>
+        </p:cTn>
+      </p:par>
+    </p:tnLst>
+  </p:timing>
+</p:sld>
+</file>
+
+<file path=ppt/slides/slide5.xml><?xml version="1.0" encoding="utf-8"?>
+<p:sld xmlns:a="http://schemas.openxmlformats.org/drawingml/2006/main" xmlns:r="http://schemas.openxmlformats.org/officeDocument/2006/relationships" xmlns:p="http://schemas.openxmlformats.org/presentationml/2006/main">
+  <p:cSld>
+    <p:spTree>
+      <p:nvGrpSpPr>
+        <p:cNvPr id="1" name=""/>
+        <p:cNvGrpSpPr/>
+        <p:nvPr/>
+      </p:nvGrpSpPr>
+      <p:grpSpPr>
+        <a:xfrm>
+          <a:off x="0" y="0"/>
+          <a:ext cx="0" cy="0"/>
+          <a:chOff x="0" y="0"/>
+          <a:chExt cx="0" cy="0"/>
+        </a:xfrm>
+      </p:grpSpPr>
+      <p:sp>
+        <p:nvSpPr>
+          <p:cNvPr id="2" name="Title 1">
+            <a:extLst>
+              <a:ext uri="{FF2B5EF4-FFF2-40B4-BE49-F238E27FC236}">
+                <a16:creationId xmlns:a16="http://schemas.microsoft.com/office/drawing/2014/main" id="{005EA678-6774-AB44-AE93-1ADF3B30C35F}"/>
+              </a:ext>
+            </a:extLst>
+          </p:cNvPr>
+          <p:cNvSpPr>
+            <a:spLocks noGrp="1"/>
+          </p:cNvSpPr>
+          <p:nvPr>
+            <p:ph type="title"/>
+          </p:nvPr>
+        </p:nvSpPr>
+        <p:spPr>
+          <a:xfrm>
+            <a:off x="0" y="0"/>
+            <a:ext cx="10515600" cy="1325563"/>
+          </a:xfrm>
+        </p:spPr>
+        <p:txBody>
+          <a:bodyPr/>
+          <a:lstStyle/>
+          <a:p>
+            <a:r>
+              <a:rPr lang="en-US" dirty="0"/>
+              <a:t>Temperature vs PM2.5 in MN From Purple Air</a:t>
+            </a:r>
+          </a:p>
+        </p:txBody>
+      </p:sp>
+      <p:pic>
+        <p:nvPicPr>
+          <p:cNvPr id="5" name="Picture 4" descr="A screenshot of a cell phone&#10;&#10;Description automatically generated">
+            <a:extLst>
+              <a:ext uri="{FF2B5EF4-FFF2-40B4-BE49-F238E27FC236}">
+                <a16:creationId xmlns:a16="http://schemas.microsoft.com/office/drawing/2014/main" id="{4D95E18E-D41A-D145-A7F5-DD0C9AA973FE}"/>
+              </a:ext>
+            </a:extLst>
+          </p:cNvPr>
+          <p:cNvPicPr>
+            <a:picLocks noChangeAspect="1"/>
+          </p:cNvPicPr>
+          <p:nvPr/>
+        </p:nvPicPr>
+        <p:blipFill>
+          <a:blip r:embed="rId2"/>
+          <a:stretch>
+            <a:fillRect/>
+          </a:stretch>
+        </p:blipFill>
+        <p:spPr>
+          <a:xfrm>
+            <a:off x="0" y="1011124"/>
+            <a:ext cx="5486400" cy="3657600"/>
+          </a:xfrm>
+          <a:prstGeom prst="rect">
+            <a:avLst/>
+          </a:prstGeom>
+        </p:spPr>
+      </p:pic>
+      <p:pic>
+        <p:nvPicPr>
+          <p:cNvPr id="6" name="Picture 5">
+            <a:extLst>
+              <a:ext uri="{FF2B5EF4-FFF2-40B4-BE49-F238E27FC236}">
+                <a16:creationId xmlns:a16="http://schemas.microsoft.com/office/drawing/2014/main" id="{BEC0594F-09A1-FA46-B916-532A572D5745}"/>
+              </a:ext>
+            </a:extLst>
+          </p:cNvPr>
+          <p:cNvPicPr>
+            <a:picLocks noChangeAspect="1"/>
+          </p:cNvPicPr>
+          <p:nvPr/>
+        </p:nvPicPr>
+        <p:blipFill>
+          <a:blip r:embed="rId3"/>
+          <a:stretch>
+            <a:fillRect/>
+          </a:stretch>
+        </p:blipFill>
+        <p:spPr>
+          <a:xfrm>
+            <a:off x="3124200" y="1011124"/>
+            <a:ext cx="8833450" cy="2940957"/>
+          </a:xfrm>
+          <a:prstGeom prst="rect">
+            <a:avLst/>
+          </a:prstGeom>
+        </p:spPr>
+      </p:pic>
+      <p:pic>
+        <p:nvPicPr>
+          <p:cNvPr id="7" name="Picture 6">
+            <a:extLst>
+              <a:ext uri="{FF2B5EF4-FFF2-40B4-BE49-F238E27FC236}">
+                <a16:creationId xmlns:a16="http://schemas.microsoft.com/office/drawing/2014/main" id="{BE377AC2-7B32-9D40-9629-F585D68A23EC}"/>
+              </a:ext>
+            </a:extLst>
+          </p:cNvPr>
+          <p:cNvPicPr>
+            <a:picLocks noChangeAspect="1"/>
+          </p:cNvPicPr>
+          <p:nvPr/>
+        </p:nvPicPr>
+        <p:blipFill>
+          <a:blip r:embed="rId4"/>
+          <a:stretch>
+            <a:fillRect/>
+          </a:stretch>
+        </p:blipFill>
+        <p:spPr>
+          <a:xfrm>
+            <a:off x="3975100" y="3952081"/>
+            <a:ext cx="6540500" cy="355600"/>
+          </a:xfrm>
+          <a:prstGeom prst="rect">
+            <a:avLst/>
+          </a:prstGeom>
+        </p:spPr>
+      </p:pic>
+      <p:pic>
+        <p:nvPicPr>
+          <p:cNvPr id="9" name="Picture 8" descr="A screenshot of a cell phone&#10;&#10;Description automatically generated">
+            <a:extLst>
+              <a:ext uri="{FF2B5EF4-FFF2-40B4-BE49-F238E27FC236}">
+                <a16:creationId xmlns:a16="http://schemas.microsoft.com/office/drawing/2014/main" id="{ACE077BD-7E45-1641-A547-B721515005FE}"/>
+              </a:ext>
+            </a:extLst>
+          </p:cNvPr>
+          <p:cNvPicPr>
+            <a:picLocks noChangeAspect="1"/>
+          </p:cNvPicPr>
+          <p:nvPr/>
+        </p:nvPicPr>
+        <p:blipFill>
+          <a:blip r:embed="rId5"/>
+          <a:stretch>
+            <a:fillRect/>
+          </a:stretch>
+        </p:blipFill>
+        <p:spPr>
+          <a:xfrm>
+            <a:off x="6096000" y="2839924"/>
+            <a:ext cx="5486400" cy="3657600"/>
+          </a:xfrm>
+          <a:prstGeom prst="rect">
+            <a:avLst/>
+          </a:prstGeom>
+        </p:spPr>
+      </p:pic>
+      <p:pic>
+        <p:nvPicPr>
+          <p:cNvPr id="10" name="Picture 9">
+            <a:extLst>
+              <a:ext uri="{FF2B5EF4-FFF2-40B4-BE49-F238E27FC236}">
+                <a16:creationId xmlns:a16="http://schemas.microsoft.com/office/drawing/2014/main" id="{8E4448A7-E23C-504C-9930-B9BAB0A9E39E}"/>
+              </a:ext>
+            </a:extLst>
+          </p:cNvPr>
+          <p:cNvPicPr>
+            <a:picLocks noChangeAspect="1"/>
+          </p:cNvPicPr>
+          <p:nvPr/>
+        </p:nvPicPr>
+        <p:blipFill>
+          <a:blip r:embed="rId6"/>
+          <a:stretch>
+            <a:fillRect/>
+          </a:stretch>
+        </p:blipFill>
+        <p:spPr>
+          <a:xfrm>
+            <a:off x="7540925" y="6512945"/>
+            <a:ext cx="2984500" cy="330200"/>
+          </a:xfrm>
+          <a:prstGeom prst="rect">
+            <a:avLst/>
+          </a:prstGeom>
+        </p:spPr>
+      </p:pic>
+    </p:spTree>
+    <p:extLst>
+      <p:ext uri="{BB962C8B-B14F-4D97-AF65-F5344CB8AC3E}">
+        <p14:creationId xmlns:p14="http://schemas.microsoft.com/office/powerpoint/2010/main" val="4198595040"/>
+      </p:ext>
+    </p:extLst>
+  </p:cSld>
+  <p:clrMapOvr>
+    <a:masterClrMapping/>
+  </p:clrMapOvr>
+  <p:timing>
+    <p:tnLst>
+      <p:par>
+        <p:cTn id="1" dur="indefinite" restart="never" nodeType="tmRoot">
+          <p:childTnLst>
+            <p:seq concurrent="1" nextAc="seek">
+              <p:cTn id="2" dur="indefinite" nodeType="mainSeq">
+                <p:childTnLst>
+                  <p:par>
+                    <p:cTn id="3" fill="hold">
+                      <p:stCondLst>
+                        <p:cond delay="indefinite"/>
+                      </p:stCondLst>
+                      <p:childTnLst>
+                        <p:par>
+                          <p:cTn id="4" fill="hold">
+                            <p:stCondLst>
+                              <p:cond delay="0"/>
+                            </p:stCondLst>
+                            <p:childTnLst>
+                              <p:par>
+                                <p:cTn id="5" presetID="1" presetClass="entr" presetSubtype="0" fill="hold" nodeType="clickEffect">
+                                  <p:stCondLst>
+                                    <p:cond delay="0"/>
+                                  </p:stCondLst>
+                                  <p:childTnLst>
+                                    <p:set>
+                                      <p:cBhvr>
+                                        <p:cTn id="6" dur="1" fill="hold">
+                                          <p:stCondLst>
+                                            <p:cond delay="0"/>
+                                          </p:stCondLst>
+                                        </p:cTn>
+                                        <p:tgtEl>
+                                          <p:spTgt spid="6"/>
+                                        </p:tgtEl>
+                                        <p:attrNameLst>
+                                          <p:attrName>style.visibility</p:attrName>
+                                        </p:attrNameLst>
+                                      </p:cBhvr>
+                                      <p:to>
+                                        <p:strVal val="visible"/>
+                                      </p:to>
+                                    </p:set>
+                                  </p:childTnLst>
+                                </p:cTn>
+                              </p:par>
+                            </p:childTnLst>
+                          </p:cTn>
+                        </p:par>
+                      </p:childTnLst>
+                    </p:cTn>
+                  </p:par>
+                  <p:par>
+                    <p:cTn id="7" fill="hold">
+                      <p:stCondLst>
+                        <p:cond delay="indefinite"/>
+                      </p:stCondLst>
+                      <p:childTnLst>
+                        <p:par>
+                          <p:cTn id="8" fill="hold">
+                            <p:stCondLst>
+                              <p:cond delay="0"/>
+                            </p:stCondLst>
+                            <p:childTnLst>
+                              <p:par>
+                                <p:cTn id="9" presetID="1" presetClass="entr" presetSubtype="0" fill="hold" nodeType="clickEffect">
+                                  <p:stCondLst>
+                                    <p:cond delay="0"/>
+                                  </p:stCondLst>
+                                  <p:childTnLst>
+                                    <p:set>
+                                      <p:cBhvr>
+                                        <p:cTn id="10" dur="1" fill="hold">
+                                          <p:stCondLst>
+                                            <p:cond delay="0"/>
+                                          </p:stCondLst>
+                                        </p:cTn>
+                                        <p:tgtEl>
+                                          <p:spTgt spid="7"/>
+                                        </p:tgtEl>
+                                        <p:attrNameLst>
+                                          <p:attrName>style.visibility</p:attrName>
+                                        </p:attrNameLst>
+                                      </p:cBhvr>
+                                      <p:to>
+                                        <p:strVal val="visible"/>
+                                      </p:to>
+                                    </p:set>
+                                  </p:childTnLst>
+                                </p:cTn>
+                              </p:par>
+                            </p:childTnLst>
+                          </p:cTn>
+                        </p:par>
+                      </p:childTnLst>
+                    </p:cTn>
+                  </p:par>
+                  <p:par>
+                    <p:cTn id="11" fill="hold">
+                      <p:stCondLst>
+                        <p:cond delay="indefinite"/>
+                      </p:stCondLst>
+                      <p:childTnLst>
+                        <p:par>
+                          <p:cTn id="12" fill="hold">
+                            <p:stCondLst>
+                              <p:cond delay="0"/>
+                            </p:stCondLst>
+                            <p:childTnLst>
+                              <p:par>
+                                <p:cTn id="13" presetID="1" presetClass="exit" presetSubtype="0" fill="hold" nodeType="clickEffect">
+                                  <p:stCondLst>
+                                    <p:cond delay="0"/>
+                                  </p:stCondLst>
+                                  <p:childTnLst>
+                                    <p:set>
+                                      <p:cBhvr>
+                                        <p:cTn id="14" dur="1" fill="hold">
+                                          <p:stCondLst>
+                                            <p:cond delay="0"/>
+                                          </p:stCondLst>
+                                        </p:cTn>
+                                        <p:tgtEl>
+                                          <p:spTgt spid="6"/>
+                                        </p:tgtEl>
+                                        <p:attrNameLst>
+                                          <p:attrName>style.visibility</p:attrName>
+                                        </p:attrNameLst>
+                                      </p:cBhvr>
+                                      <p:to>
+                                        <p:strVal val="hidden"/>
+                                      </p:to>
+                                    </p:set>
+                                  </p:childTnLst>
+                                </p:cTn>
+                              </p:par>
+                              <p:par>
+                                <p:cTn id="15" presetID="1" presetClass="exit" presetSubtype="0" fill="hold" nodeType="withEffect">
+                                  <p:stCondLst>
+                                    <p:cond delay="0"/>
+                                  </p:stCondLst>
+                                  <p:childTnLst>
+                                    <p:set>
+                                      <p:cBhvr>
+                                        <p:cTn id="16" dur="1" fill="hold">
+                                          <p:stCondLst>
+                                            <p:cond delay="0"/>
+                                          </p:stCondLst>
+                                        </p:cTn>
+                                        <p:tgtEl>
+                                          <p:spTgt spid="7"/>
+                                        </p:tgtEl>
+                                        <p:attrNameLst>
+                                          <p:attrName>style.visibility</p:attrName>
+                                        </p:attrNameLst>
+                                      </p:cBhvr>
+                                      <p:to>
+                                        <p:strVal val="hidden"/>
+                                      </p:to>
+                                    </p:set>
+                                  </p:childTnLst>
+                                </p:cTn>
+                              </p:par>
+                              <p:par>
+                                <p:cTn id="17" presetID="1" presetClass="entr" presetSubtype="0" fill="hold" nodeType="withEffect">
+                                  <p:stCondLst>
+                                    <p:cond delay="0"/>
+                                  </p:stCondLst>
+                                  <p:childTnLst>
+                                    <p:set>
+                                      <p:cBhvr>
+                                        <p:cTn id="18" dur="1" fill="hold">
+                                          <p:stCondLst>
+                                            <p:cond delay="0"/>
+                                          </p:stCondLst>
+                                        </p:cTn>
+                                        <p:tgtEl>
+                                          <p:spTgt spid="9"/>
+                                        </p:tgtEl>
+                                        <p:attrNameLst>
+                                          <p:attrName>style.visibility</p:attrName>
+                                        </p:attrNameLst>
+                                      </p:cBhvr>
+                                      <p:to>
+                                        <p:strVal val="visible"/>
+                                      </p:to>
+                                    </p:set>
+                                  </p:childTnLst>
+                                </p:cTn>
+                              </p:par>
+                              <p:par>
+                                <p:cTn id="19" presetID="1" presetClass="entr" presetSubtype="0" fill="hold" nodeType="withEffect">
+                                  <p:stCondLst>
+                                    <p:cond delay="0"/>
+                                  </p:stCondLst>
+                                  <p:childTnLst>
+                                    <p:set>
+                                      <p:cBhvr>
+                                        <p:cTn id="20" dur="1" fill="hold">
+                                          <p:stCondLst>
+                                            <p:cond delay="0"/>
+                                          </p:stCondLst>
+                                        </p:cTn>
+                                        <p:tgtEl>
+                                          <p:spTgt spid="10"/>
+                                        </p:tgtEl>
+                                        <p:attrNameLst>
+                                          <p:attrName>style.visibility</p:attrName>
+                                        </p:attrNameLst>
+                                      </p:cBhvr>
+                                      <p:to>
+                                        <p:strVal val="visible"/>
+                                      </p:to>
+                                    </p:set>
+                                  </p:childTnLst>
+                                </p:cTn>
+                              </p:par>
+                            </p:childTnLst>
+                          </p:cTn>
+                        </p:par>
+                      </p:childTnLst>
+                    </p:cTn>
+                  </p:par>
+                </p:childTnLst>
+              </p:cTn>
+              <p:prevCondLst>
+                <p:cond evt="onPrev" delay="0">
+                  <p:tgtEl>
+                    <p:sldTgt/>
+                  </p:tgtEl>
+                </p:cond>
+              </p:prevCondLst>
+              <p:nextCondLst>
+                <p:cond evt="onNext" delay="0">
+                  <p:tgtEl>
+                    <p:sldTgt/>
+                  </p:tgtEl>
+                </p:cond>
+              </p:nextCondLst>
+            </p:seq>
+          </p:childTnLst>
+        </p:cTn>
+      </p:par>
+    </p:tnLst>
+  </p:timing>
 </p:sld>
 </file>
 

</xml_diff>